<commit_message>
Worked on my slides
</commit_message>
<xml_diff>
--- a/Presentations/Week 5.pptx
+++ b/Presentations/Week 5.pptx
@@ -206,7 +206,7 @@
           <a:p>
             <a:fld id="{77C6FF30-EFD7-4437-901C-DE7AE577CC7B}" type="datetimeFigureOut">
               <a:rPr lang="en-GB" smtClean="0"/>
-              <a:t>28/02/2018</a:t>
+              <a:t>05/03/2018</a:t>
             </a:fld>
             <a:endParaRPr lang="en-GB"/>
           </a:p>
@@ -518,6 +518,801 @@
           <a:bodyPr/>
           <a:lstStyle/>
           <a:p>
+            <a:r>
+              <a:rPr lang="en-GB" dirty="0"/>
+              <a:t>The Assignment</a:t>
+            </a:r>
+          </a:p>
+          <a:p>
+            <a:pPr marL="457200" marR="0" lvl="0" indent="-474344" algn="just" rtl="0">
+              <a:lnSpc>
+                <a:spcPct val="150000"/>
+              </a:lnSpc>
+              <a:spcBef>
+                <a:spcPts val="0"/>
+              </a:spcBef>
+              <a:spcAft>
+                <a:spcPts val="0"/>
+              </a:spcAft>
+              <a:buClr>
+                <a:srgbClr val="FF0000"/>
+              </a:buClr>
+              <a:buSzPts val="1800"/>
+              <a:buFont typeface="Tahoma"/>
+              <a:buAutoNum type="arabicPeriod"/>
+            </a:pPr>
+            <a:r>
+              <a:rPr lang="en-US" sz="1200" dirty="0">
+                <a:solidFill>
+                  <a:schemeClr val="dk1"/>
+                </a:solidFill>
+                <a:latin typeface="Tahoma"/>
+                <a:ea typeface="Tahoma"/>
+                <a:cs typeface="Tahoma"/>
+                <a:sym typeface="Tahoma"/>
+              </a:rPr>
+              <a:t>2D Game</a:t>
+            </a:r>
+          </a:p>
+          <a:p>
+            <a:pPr marL="457200" marR="0" lvl="0" indent="-474344" algn="just" rtl="0">
+              <a:lnSpc>
+                <a:spcPct val="150000"/>
+              </a:lnSpc>
+              <a:spcBef>
+                <a:spcPts val="360"/>
+              </a:spcBef>
+              <a:spcAft>
+                <a:spcPts val="0"/>
+              </a:spcAft>
+              <a:buClr>
+                <a:srgbClr val="FF0000"/>
+              </a:buClr>
+              <a:buSzPts val="1800"/>
+              <a:buFont typeface="Tahoma"/>
+              <a:buAutoNum type="arabicPeriod"/>
+            </a:pPr>
+            <a:r>
+              <a:rPr lang="en-US" sz="1200" i="0" u="none" strike="noStrike" cap="none" dirty="0">
+                <a:solidFill>
+                  <a:schemeClr val="dk1"/>
+                </a:solidFill>
+                <a:latin typeface="Tahoma"/>
+                <a:ea typeface="Tahoma"/>
+                <a:cs typeface="Tahoma"/>
+                <a:sym typeface="Tahoma"/>
+              </a:rPr>
+              <a:t>Main control mechanic is </a:t>
+            </a:r>
+            <a:r>
+              <a:rPr lang="en-US" sz="1200" dirty="0">
+                <a:solidFill>
+                  <a:schemeClr val="dk1"/>
+                </a:solidFill>
+                <a:latin typeface="Tahoma"/>
+                <a:ea typeface="Tahoma"/>
+                <a:cs typeface="Tahoma"/>
+                <a:sym typeface="Tahoma"/>
+              </a:rPr>
+              <a:t>a simple tap</a:t>
+            </a:r>
+          </a:p>
+          <a:p>
+            <a:pPr marL="457200" marR="0" lvl="0" indent="-474344" algn="just" rtl="0">
+              <a:lnSpc>
+                <a:spcPct val="150000"/>
+              </a:lnSpc>
+              <a:spcBef>
+                <a:spcPts val="360"/>
+              </a:spcBef>
+              <a:spcAft>
+                <a:spcPts val="0"/>
+              </a:spcAft>
+              <a:buClr>
+                <a:srgbClr val="FF0000"/>
+              </a:buClr>
+              <a:buSzPts val="1800"/>
+              <a:buFont typeface="Tahoma"/>
+              <a:buAutoNum type="arabicPeriod"/>
+            </a:pPr>
+            <a:r>
+              <a:rPr lang="en-US" sz="1200" dirty="0">
+                <a:solidFill>
+                  <a:schemeClr val="dk1"/>
+                </a:solidFill>
+                <a:latin typeface="Tahoma"/>
+                <a:ea typeface="Tahoma"/>
+                <a:cs typeface="Tahoma"/>
+                <a:sym typeface="Tahoma"/>
+              </a:rPr>
+              <a:t>Multiplayer </a:t>
+            </a:r>
+            <a:r>
+              <a:rPr lang="en-US" sz="1200" i="0" u="none" strike="noStrike" cap="none" dirty="0">
+                <a:solidFill>
+                  <a:schemeClr val="dk1"/>
+                </a:solidFill>
+                <a:latin typeface="Tahoma"/>
+                <a:ea typeface="Tahoma"/>
+                <a:cs typeface="Tahoma"/>
+                <a:sym typeface="Tahoma"/>
+              </a:rPr>
+              <a:t>– by taking turns</a:t>
+            </a:r>
+          </a:p>
+          <a:p>
+            <a:pPr marL="457200" marR="0" lvl="0" indent="-474344" algn="just" rtl="0">
+              <a:lnSpc>
+                <a:spcPct val="150000"/>
+              </a:lnSpc>
+              <a:spcBef>
+                <a:spcPts val="360"/>
+              </a:spcBef>
+              <a:spcAft>
+                <a:spcPts val="0"/>
+              </a:spcAft>
+              <a:buClr>
+                <a:srgbClr val="FF0000"/>
+              </a:buClr>
+              <a:buSzPts val="1800"/>
+              <a:buFont typeface="Tahoma"/>
+              <a:buAutoNum type="arabicPeriod"/>
+            </a:pPr>
+            <a:r>
+              <a:rPr lang="en-US" sz="1200" i="0" u="none" strike="noStrike" cap="none" dirty="0">
+                <a:solidFill>
+                  <a:schemeClr val="dk1"/>
+                </a:solidFill>
+                <a:latin typeface="Tahoma"/>
+                <a:ea typeface="Tahoma"/>
+                <a:cs typeface="Tahoma"/>
+                <a:sym typeface="Tahoma"/>
+              </a:rPr>
+              <a:t>On a single device </a:t>
+            </a:r>
+          </a:p>
+          <a:p>
+            <a:pPr marL="457200" marR="0" lvl="0" indent="-474344" algn="just" rtl="0">
+              <a:lnSpc>
+                <a:spcPct val="150000"/>
+              </a:lnSpc>
+              <a:spcBef>
+                <a:spcPts val="360"/>
+              </a:spcBef>
+              <a:spcAft>
+                <a:spcPts val="0"/>
+              </a:spcAft>
+              <a:buClr>
+                <a:srgbClr val="FF0000"/>
+              </a:buClr>
+              <a:buSzPts val="1800"/>
+              <a:buFont typeface="Tahoma"/>
+              <a:buAutoNum type="arabicPeriod"/>
+            </a:pPr>
+            <a:r>
+              <a:rPr lang="en-US" sz="1200" i="0" u="none" strike="noStrike" cap="none" dirty="0">
+                <a:solidFill>
+                  <a:schemeClr val="dk1"/>
+                </a:solidFill>
+                <a:latin typeface="Tahoma"/>
+                <a:ea typeface="Tahoma"/>
+                <a:cs typeface="Tahoma"/>
+                <a:sym typeface="Tahoma"/>
+              </a:rPr>
+              <a:t>Symmetric</a:t>
+            </a:r>
+          </a:p>
+          <a:p>
+            <a:pPr marL="457200" marR="0" lvl="0" indent="-474344" algn="just" rtl="0">
+              <a:lnSpc>
+                <a:spcPct val="150000"/>
+              </a:lnSpc>
+              <a:spcBef>
+                <a:spcPts val="360"/>
+              </a:spcBef>
+              <a:buClr>
+                <a:srgbClr val="FF0000"/>
+              </a:buClr>
+              <a:buSzPts val="1800"/>
+              <a:buFont typeface="Tahoma"/>
+              <a:buAutoNum type="arabicPeriod"/>
+            </a:pPr>
+            <a:r>
+              <a:rPr lang="en-US" sz="1200" i="0" u="none" strike="noStrike" cap="none" dirty="0">
+                <a:solidFill>
+                  <a:schemeClr val="dk1"/>
+                </a:solidFill>
+                <a:latin typeface="Tahoma"/>
+                <a:ea typeface="Tahoma"/>
+                <a:cs typeface="Tahoma"/>
+                <a:sym typeface="Tahoma"/>
+              </a:rPr>
+              <a:t>Simple and intuitive rules</a:t>
+            </a:r>
+          </a:p>
+          <a:p>
+            <a:pPr marL="0" marR="0" lvl="0" indent="0" algn="just" rtl="0">
+              <a:lnSpc>
+                <a:spcPct val="150000"/>
+              </a:lnSpc>
+              <a:spcBef>
+                <a:spcPts val="360"/>
+              </a:spcBef>
+              <a:buClr>
+                <a:srgbClr val="FF0000"/>
+              </a:buClr>
+              <a:buSzPts val="1800"/>
+              <a:buFont typeface="Tahoma"/>
+              <a:buNone/>
+            </a:pPr>
+            <a:endParaRPr lang="en-US" sz="1200" i="0" u="none" strike="noStrike" cap="none" dirty="0">
+              <a:solidFill>
+                <a:schemeClr val="dk1"/>
+              </a:solidFill>
+              <a:latin typeface="Tahoma"/>
+              <a:ea typeface="Tahoma"/>
+              <a:cs typeface="Tahoma"/>
+              <a:sym typeface="Tahoma"/>
+            </a:endParaRPr>
+          </a:p>
+          <a:p>
+            <a:pPr marL="0" marR="0" lvl="0" indent="0" algn="just" rtl="0">
+              <a:lnSpc>
+                <a:spcPct val="150000"/>
+              </a:lnSpc>
+              <a:spcBef>
+                <a:spcPts val="360"/>
+              </a:spcBef>
+              <a:buClr>
+                <a:srgbClr val="FF0000"/>
+              </a:buClr>
+              <a:buSzPts val="1800"/>
+              <a:buFont typeface="Tahoma"/>
+              <a:buNone/>
+            </a:pPr>
+            <a:r>
+              <a:rPr lang="en-US" sz="1200" i="0" u="none" strike="noStrike" cap="none" dirty="0">
+                <a:solidFill>
+                  <a:schemeClr val="dk1"/>
+                </a:solidFill>
+                <a:latin typeface="Tahoma"/>
+                <a:ea typeface="Tahoma"/>
+                <a:cs typeface="Tahoma"/>
+                <a:sym typeface="Tahoma"/>
+              </a:rPr>
+              <a:t>The gameplay experience should be </a:t>
+            </a:r>
+          </a:p>
+          <a:p>
+            <a:pPr marL="228600" marR="0" lvl="0" indent="-228600" algn="just" rtl="0">
+              <a:lnSpc>
+                <a:spcPct val="150000"/>
+              </a:lnSpc>
+              <a:spcBef>
+                <a:spcPts val="360"/>
+              </a:spcBef>
+              <a:buClr>
+                <a:srgbClr val="FF0000"/>
+              </a:buClr>
+              <a:buSzPts val="1800"/>
+              <a:buFont typeface="+mj-lt"/>
+              <a:buAutoNum type="arabicPeriod"/>
+            </a:pPr>
+            <a:r>
+              <a:rPr lang="en-US" sz="1200" i="0" u="none" strike="noStrike" cap="none" dirty="0">
+                <a:solidFill>
+                  <a:schemeClr val="dk1"/>
+                </a:solidFill>
+                <a:latin typeface="Tahoma"/>
+                <a:ea typeface="Tahoma"/>
+                <a:cs typeface="Tahoma"/>
+                <a:sym typeface="Tahoma"/>
+              </a:rPr>
+              <a:t>Engaging</a:t>
+            </a:r>
+          </a:p>
+          <a:p>
+            <a:pPr marL="228600" marR="0" lvl="0" indent="-228600" algn="just" rtl="0">
+              <a:lnSpc>
+                <a:spcPct val="150000"/>
+              </a:lnSpc>
+              <a:spcBef>
+                <a:spcPts val="360"/>
+              </a:spcBef>
+              <a:buClr>
+                <a:srgbClr val="FF0000"/>
+              </a:buClr>
+              <a:buSzPts val="1800"/>
+              <a:buFont typeface="+mj-lt"/>
+              <a:buAutoNum type="arabicPeriod"/>
+            </a:pPr>
+            <a:r>
+              <a:rPr lang="en-US" sz="1200" i="0" u="none" strike="noStrike" cap="none" dirty="0">
+                <a:solidFill>
+                  <a:schemeClr val="dk1"/>
+                </a:solidFill>
+                <a:latin typeface="Tahoma"/>
+                <a:ea typeface="Tahoma"/>
+                <a:cs typeface="Tahoma"/>
+                <a:sym typeface="Tahoma"/>
+              </a:rPr>
+              <a:t>Focused</a:t>
+            </a:r>
+          </a:p>
+          <a:p>
+            <a:pPr marL="228600" marR="0" lvl="0" indent="-228600" algn="just" rtl="0">
+              <a:lnSpc>
+                <a:spcPct val="150000"/>
+              </a:lnSpc>
+              <a:spcBef>
+                <a:spcPts val="360"/>
+              </a:spcBef>
+              <a:buClr>
+                <a:srgbClr val="FF0000"/>
+              </a:buClr>
+              <a:buSzPts val="1800"/>
+              <a:buFont typeface="+mj-lt"/>
+              <a:buAutoNum type="arabicPeriod"/>
+            </a:pPr>
+            <a:r>
+              <a:rPr lang="en-US" sz="1200" i="0" u="none" strike="noStrike" cap="none" dirty="0">
+                <a:solidFill>
+                  <a:schemeClr val="dk1"/>
+                </a:solidFill>
+                <a:latin typeface="Tahoma"/>
+                <a:ea typeface="Tahoma"/>
+                <a:cs typeface="Tahoma"/>
+                <a:sym typeface="Tahoma"/>
+              </a:rPr>
+              <a:t>Polished</a:t>
+            </a:r>
+          </a:p>
+          <a:p>
+            <a:pPr marL="0" marR="0" lvl="0" indent="0" algn="just" rtl="0">
+              <a:lnSpc>
+                <a:spcPct val="150000"/>
+              </a:lnSpc>
+              <a:spcBef>
+                <a:spcPts val="360"/>
+              </a:spcBef>
+              <a:buClr>
+                <a:srgbClr val="FF0000"/>
+              </a:buClr>
+              <a:buSzPts val="1800"/>
+              <a:buFont typeface="+mj-lt"/>
+              <a:buNone/>
+            </a:pPr>
+            <a:endParaRPr lang="en-US" sz="1200" i="0" u="none" strike="noStrike" cap="none" dirty="0">
+              <a:solidFill>
+                <a:schemeClr val="dk1"/>
+              </a:solidFill>
+              <a:latin typeface="Tahoma"/>
+              <a:ea typeface="Tahoma"/>
+              <a:cs typeface="Tahoma"/>
+              <a:sym typeface="Tahoma"/>
+            </a:endParaRPr>
+          </a:p>
+          <a:p>
+            <a:pPr marL="0" marR="0" lvl="0" indent="0" algn="just" rtl="0">
+              <a:lnSpc>
+                <a:spcPct val="150000"/>
+              </a:lnSpc>
+              <a:spcBef>
+                <a:spcPts val="360"/>
+              </a:spcBef>
+              <a:buClr>
+                <a:srgbClr val="FF0000"/>
+              </a:buClr>
+              <a:buSzPts val="1800"/>
+              <a:buFont typeface="+mj-lt"/>
+              <a:buNone/>
+            </a:pPr>
+            <a:r>
+              <a:rPr lang="en-US" sz="1200" i="0" u="none" strike="noStrike" cap="none" dirty="0">
+                <a:solidFill>
+                  <a:schemeClr val="dk1"/>
+                </a:solidFill>
+                <a:latin typeface="Tahoma"/>
+                <a:ea typeface="Tahoma"/>
+                <a:cs typeface="Tahoma"/>
+                <a:sym typeface="Tahoma"/>
+              </a:rPr>
+              <a:t>Why mobile?</a:t>
+            </a:r>
+          </a:p>
+          <a:p>
+            <a:pPr marL="228600" marR="0" lvl="0" indent="-228600" algn="just" rtl="0">
+              <a:lnSpc>
+                <a:spcPct val="150000"/>
+              </a:lnSpc>
+              <a:spcBef>
+                <a:spcPts val="360"/>
+              </a:spcBef>
+              <a:buClr>
+                <a:srgbClr val="FF0000"/>
+              </a:buClr>
+              <a:buSzPts val="1800"/>
+              <a:buFont typeface="+mj-lt"/>
+              <a:buAutoNum type="arabicPeriod"/>
+            </a:pPr>
+            <a:r>
+              <a:rPr lang="en-US" sz="1200" i="0" u="none" strike="noStrike" cap="none" dirty="0">
+                <a:solidFill>
+                  <a:schemeClr val="dk1"/>
+                </a:solidFill>
+                <a:latin typeface="Tahoma"/>
+                <a:ea typeface="Tahoma"/>
+                <a:cs typeface="Tahoma"/>
+                <a:sym typeface="Tahoma"/>
+              </a:rPr>
+              <a:t>Growing at a phenomenal pace</a:t>
+            </a:r>
+          </a:p>
+          <a:p>
+            <a:pPr marL="228600" marR="0" lvl="0" indent="-228600" algn="just" rtl="0">
+              <a:lnSpc>
+                <a:spcPct val="150000"/>
+              </a:lnSpc>
+              <a:spcBef>
+                <a:spcPts val="360"/>
+              </a:spcBef>
+              <a:buClr>
+                <a:srgbClr val="FF0000"/>
+              </a:buClr>
+              <a:buSzPts val="1800"/>
+              <a:buFont typeface="+mj-lt"/>
+              <a:buAutoNum type="arabicPeriod"/>
+            </a:pPr>
+            <a:endParaRPr lang="en-US" sz="1200" i="0" u="none" strike="noStrike" cap="none" dirty="0">
+              <a:solidFill>
+                <a:schemeClr val="dk1"/>
+              </a:solidFill>
+              <a:latin typeface="Tahoma"/>
+              <a:ea typeface="Tahoma"/>
+              <a:cs typeface="Tahoma"/>
+              <a:sym typeface="Tahoma"/>
+            </a:endParaRPr>
+          </a:p>
+          <a:p>
+            <a:pPr marL="0" marR="0" lvl="0" indent="0" algn="just" rtl="0">
+              <a:lnSpc>
+                <a:spcPct val="150000"/>
+              </a:lnSpc>
+              <a:spcBef>
+                <a:spcPts val="360"/>
+              </a:spcBef>
+              <a:buClr>
+                <a:srgbClr val="FF0000"/>
+              </a:buClr>
+              <a:buSzPts val="1800"/>
+              <a:buFont typeface="+mj-lt"/>
+              <a:buNone/>
+            </a:pPr>
+            <a:r>
+              <a:rPr lang="en-US" sz="1200" i="0" u="none" strike="noStrike" cap="none" dirty="0">
+                <a:solidFill>
+                  <a:schemeClr val="dk1"/>
+                </a:solidFill>
+                <a:latin typeface="Tahoma"/>
+                <a:ea typeface="Tahoma"/>
+                <a:cs typeface="Tahoma"/>
+                <a:sym typeface="Tahoma"/>
+              </a:rPr>
+              <a:t>Why tap?</a:t>
+            </a:r>
+          </a:p>
+          <a:p>
+            <a:pPr marL="457200" lvl="0" indent="-342900">
+              <a:spcBef>
+                <a:spcPts val="0"/>
+              </a:spcBef>
+              <a:spcAft>
+                <a:spcPts val="0"/>
+              </a:spcAft>
+              <a:buSzPts val="1800"/>
+              <a:buFont typeface="Tahoma"/>
+              <a:buChar char="•"/>
+            </a:pPr>
+            <a:r>
+              <a:rPr lang="en-US" sz="1200" b="0" i="0" dirty="0">
+                <a:latin typeface="Tahoma"/>
+                <a:ea typeface="Tahoma"/>
+                <a:cs typeface="Tahoma"/>
+                <a:sym typeface="Tahoma"/>
+              </a:rPr>
+              <a:t>Casual Users don’t have years of gaming experience</a:t>
+            </a:r>
+          </a:p>
+          <a:p>
+            <a:pPr marL="457200" lvl="0" indent="-342900">
+              <a:spcBef>
+                <a:spcPts val="0"/>
+              </a:spcBef>
+              <a:spcAft>
+                <a:spcPts val="0"/>
+              </a:spcAft>
+              <a:buSzPts val="1800"/>
+              <a:buFont typeface="Tahoma"/>
+              <a:buChar char="•"/>
+            </a:pPr>
+            <a:r>
+              <a:rPr lang="en-US" sz="1200" b="0" i="0" dirty="0">
+                <a:latin typeface="Tahoma"/>
+                <a:ea typeface="Tahoma"/>
+                <a:cs typeface="Tahoma"/>
+                <a:sym typeface="Tahoma"/>
+              </a:rPr>
+              <a:t>Casual Users don’t have the dexterity of gamers</a:t>
+            </a:r>
+          </a:p>
+          <a:p>
+            <a:pPr marL="457200" lvl="0" indent="-342900" rtl="0">
+              <a:spcBef>
+                <a:spcPts val="0"/>
+              </a:spcBef>
+              <a:buSzPts val="1800"/>
+              <a:buFont typeface="Tahoma"/>
+              <a:buChar char="•"/>
+            </a:pPr>
+            <a:r>
+              <a:rPr lang="en-US" sz="1200" b="0" i="0" dirty="0">
+                <a:latin typeface="Tahoma"/>
+                <a:ea typeface="Tahoma"/>
+                <a:cs typeface="Tahoma"/>
+                <a:sym typeface="Tahoma"/>
+              </a:rPr>
+              <a:t>Casual Users play on their phone to pass time</a:t>
+            </a:r>
+          </a:p>
+          <a:p>
+            <a:pPr marL="457200" lvl="0" indent="-342900" rtl="0">
+              <a:spcBef>
+                <a:spcPts val="0"/>
+              </a:spcBef>
+              <a:buSzPts val="1800"/>
+              <a:buFont typeface="Tahoma"/>
+              <a:buChar char="•"/>
+            </a:pPr>
+            <a:r>
+              <a:rPr lang="en-US" sz="1200" i="0" u="none" strike="noStrike" cap="none" dirty="0">
+                <a:solidFill>
+                  <a:schemeClr val="dk1"/>
+                </a:solidFill>
+                <a:latin typeface="Tahoma"/>
+                <a:ea typeface="Tahoma"/>
+                <a:cs typeface="Tahoma"/>
+                <a:sym typeface="Tahoma"/>
+              </a:rPr>
+              <a:t>So everyone can play the game</a:t>
+            </a:r>
+          </a:p>
+          <a:p>
+            <a:pPr marL="457200" lvl="0" indent="-342900" rtl="0">
+              <a:spcBef>
+                <a:spcPts val="0"/>
+              </a:spcBef>
+              <a:buSzPts val="1800"/>
+              <a:buFont typeface="Tahoma"/>
+              <a:buChar char="•"/>
+            </a:pPr>
+            <a:r>
+              <a:rPr lang="en-US" sz="1200" i="0" u="none" strike="noStrike" cap="none" dirty="0">
+                <a:solidFill>
+                  <a:schemeClr val="dk1"/>
+                </a:solidFill>
+                <a:latin typeface="Tahoma"/>
+                <a:ea typeface="Tahoma"/>
+                <a:cs typeface="Tahoma"/>
+                <a:sym typeface="Tahoma"/>
+              </a:rPr>
+              <a:t>Supports all kinds of users</a:t>
+            </a:r>
+          </a:p>
+          <a:p>
+            <a:pPr marL="457200" lvl="0" indent="-342900" rtl="0">
+              <a:spcBef>
+                <a:spcPts val="0"/>
+              </a:spcBef>
+              <a:buSzPts val="1800"/>
+              <a:buFont typeface="Tahoma"/>
+              <a:buChar char="•"/>
+            </a:pPr>
+            <a:r>
+              <a:rPr lang="en-US" sz="1200" b="0" i="0" dirty="0">
+                <a:latin typeface="Tahoma"/>
+                <a:ea typeface="Tahoma"/>
+                <a:cs typeface="Tahoma"/>
+                <a:sym typeface="Tahoma"/>
+              </a:rPr>
+              <a:t>Easy to control and understand but difficult to master! </a:t>
+            </a:r>
+            <a:endParaRPr lang="en-US" sz="1200" i="0" u="none" strike="noStrike" cap="none" dirty="0">
+              <a:solidFill>
+                <a:schemeClr val="dk1"/>
+              </a:solidFill>
+              <a:latin typeface="Tahoma"/>
+              <a:ea typeface="Tahoma"/>
+              <a:cs typeface="Tahoma"/>
+              <a:sym typeface="Tahoma"/>
+            </a:endParaRPr>
+          </a:p>
+          <a:p>
+            <a:endParaRPr lang="en-GB" dirty="0"/>
+          </a:p>
+          <a:p>
+            <a:r>
+              <a:rPr lang="en-GB" dirty="0"/>
+              <a:t>Why multiplayer?</a:t>
+            </a:r>
+          </a:p>
+          <a:p>
+            <a:pPr marL="0" marR="0" lvl="0" indent="-97155" algn="just" rtl="0">
+              <a:spcBef>
+                <a:spcPts val="0"/>
+              </a:spcBef>
+              <a:spcAft>
+                <a:spcPts val="0"/>
+              </a:spcAft>
+              <a:buClr>
+                <a:schemeClr val="accent1"/>
+              </a:buClr>
+              <a:buSzPts val="1530"/>
+              <a:buFont typeface="Arial"/>
+              <a:buNone/>
+            </a:pPr>
+            <a:r>
+              <a:rPr lang="en-GB" sz="1200" i="0" u="none" strike="noStrike" cap="none" dirty="0">
+                <a:solidFill>
+                  <a:schemeClr val="dk1"/>
+                </a:solidFill>
+                <a:latin typeface="Tahoma"/>
+                <a:ea typeface="Tahoma"/>
+                <a:cs typeface="Tahoma"/>
+                <a:sym typeface="Tahoma"/>
+              </a:rPr>
+              <a:t>The </a:t>
+            </a:r>
+            <a:r>
+              <a:rPr lang="en-GB" sz="1200" dirty="0">
+                <a:solidFill>
+                  <a:schemeClr val="dk1"/>
+                </a:solidFill>
+                <a:latin typeface="Tahoma"/>
+                <a:ea typeface="Tahoma"/>
+                <a:cs typeface="Tahoma"/>
+                <a:sym typeface="Tahoma"/>
+              </a:rPr>
+              <a:t>competitive </a:t>
+            </a:r>
+            <a:r>
+              <a:rPr lang="en-GB" sz="1200" i="0" u="none" strike="noStrike" cap="none" dirty="0">
+                <a:solidFill>
+                  <a:schemeClr val="dk1"/>
+                </a:solidFill>
+                <a:latin typeface="Tahoma"/>
+                <a:ea typeface="Tahoma"/>
+                <a:cs typeface="Tahoma"/>
+                <a:sym typeface="Tahoma"/>
+              </a:rPr>
+              <a:t>nature of the game makes it easy </a:t>
+            </a:r>
+            <a:r>
+              <a:rPr lang="en-GB" sz="1200" dirty="0">
+                <a:solidFill>
+                  <a:schemeClr val="dk1"/>
+                </a:solidFill>
+                <a:latin typeface="Tahoma"/>
+                <a:ea typeface="Tahoma"/>
+                <a:cs typeface="Tahoma"/>
+                <a:sym typeface="Tahoma"/>
+              </a:rPr>
+              <a:t>for users to commit to it giving your game a higher retention than single player games.</a:t>
+            </a:r>
+          </a:p>
+          <a:p>
+            <a:pPr marL="0" marR="0" lvl="0" indent="-97155" algn="just" rtl="0">
+              <a:spcBef>
+                <a:spcPts val="0"/>
+              </a:spcBef>
+              <a:spcAft>
+                <a:spcPts val="0"/>
+              </a:spcAft>
+              <a:buClr>
+                <a:schemeClr val="accent1"/>
+              </a:buClr>
+              <a:buSzPts val="1530"/>
+              <a:buFont typeface="Arial"/>
+              <a:buNone/>
+            </a:pPr>
+            <a:endParaRPr lang="en-GB" sz="1200" dirty="0">
+              <a:solidFill>
+                <a:schemeClr val="dk1"/>
+              </a:solidFill>
+              <a:latin typeface="Tahoma"/>
+              <a:ea typeface="Tahoma"/>
+              <a:cs typeface="Tahoma"/>
+              <a:sym typeface="Tahoma"/>
+            </a:endParaRPr>
+          </a:p>
+          <a:p>
+            <a:pPr marL="0" marR="0" lvl="0" indent="-97155" algn="just" rtl="0">
+              <a:spcBef>
+                <a:spcPts val="0"/>
+              </a:spcBef>
+              <a:spcAft>
+                <a:spcPts val="0"/>
+              </a:spcAft>
+              <a:buClr>
+                <a:schemeClr val="accent1"/>
+              </a:buClr>
+              <a:buSzPts val="1530"/>
+              <a:buFont typeface="Arial"/>
+              <a:buNone/>
+            </a:pPr>
+            <a:r>
+              <a:rPr lang="en-GB" sz="1200" dirty="0">
+                <a:solidFill>
+                  <a:schemeClr val="dk1"/>
+                </a:solidFill>
+                <a:latin typeface="Tahoma"/>
+                <a:ea typeface="Tahoma"/>
+                <a:cs typeface="Tahoma"/>
+                <a:sym typeface="Tahoma"/>
+              </a:rPr>
+              <a:t>It creates a feeling of urgency as both players progress through gameplay and approach the “finish line”.  </a:t>
+            </a:r>
+          </a:p>
+          <a:p>
+            <a:pPr marL="0" marR="0" lvl="0" indent="-97155" algn="just" rtl="0">
+              <a:spcBef>
+                <a:spcPts val="0"/>
+              </a:spcBef>
+              <a:spcAft>
+                <a:spcPts val="0"/>
+              </a:spcAft>
+              <a:buClr>
+                <a:schemeClr val="accent1"/>
+              </a:buClr>
+              <a:buSzPts val="1530"/>
+              <a:buFont typeface="Arial"/>
+              <a:buNone/>
+            </a:pPr>
+            <a:endParaRPr lang="en-GB" sz="1200" dirty="0">
+              <a:solidFill>
+                <a:schemeClr val="dk1"/>
+              </a:solidFill>
+              <a:latin typeface="Tahoma"/>
+              <a:ea typeface="Tahoma"/>
+              <a:cs typeface="Tahoma"/>
+              <a:sym typeface="Tahoma"/>
+            </a:endParaRPr>
+          </a:p>
+          <a:p>
+            <a:pPr marL="0" marR="0" lvl="0" indent="-97155" algn="just" rtl="0">
+              <a:spcBef>
+                <a:spcPts val="360"/>
+              </a:spcBef>
+              <a:buClr>
+                <a:schemeClr val="accent1"/>
+              </a:buClr>
+              <a:buSzPts val="1530"/>
+              <a:buFont typeface="Arial"/>
+              <a:buNone/>
+            </a:pPr>
+            <a:r>
+              <a:rPr lang="en-GB" sz="1200" i="0" u="none" strike="noStrike" cap="none" dirty="0">
+                <a:solidFill>
+                  <a:schemeClr val="dk1"/>
+                </a:solidFill>
+                <a:latin typeface="Tahoma"/>
+                <a:ea typeface="Tahoma"/>
+                <a:cs typeface="Tahoma"/>
+                <a:sym typeface="Tahoma"/>
+              </a:rPr>
+              <a:t>Opponents are also a strong tool in making an experience that is always fresh.</a:t>
+            </a:r>
+          </a:p>
+          <a:p>
             <a:endParaRPr lang="en-GB" dirty="0"/>
           </a:p>
         </p:txBody>
@@ -1039,6 +1834,18 @@
           <a:bodyPr/>
           <a:lstStyle/>
           <a:p>
+            <a:r>
+              <a:rPr lang="en-GB" dirty="0"/>
+              <a:t>Improve the prototype based on player feedback</a:t>
+            </a:r>
+          </a:p>
+          <a:p>
+            <a:r>
+              <a:rPr lang="en-GB" dirty="0"/>
+              <a:t>Finish the art for the game</a:t>
+            </a:r>
+          </a:p>
+          <a:p>
             <a:endParaRPr lang="en-GB" dirty="0"/>
           </a:p>
         </p:txBody>
@@ -1349,7 +2156,7 @@
           <a:p>
             <a:fld id="{F9B79F2D-3A05-4848-97F8-7B346024FD0C}" type="datetimeFigureOut">
               <a:rPr lang="en-GB" smtClean="0"/>
-              <a:t>28/02/2018</a:t>
+              <a:t>05/03/2018</a:t>
             </a:fld>
             <a:endParaRPr lang="en-GB"/>
           </a:p>
@@ -1624,7 +2431,7 @@
           <a:p>
             <a:fld id="{F9B79F2D-3A05-4848-97F8-7B346024FD0C}" type="datetimeFigureOut">
               <a:rPr lang="en-GB" smtClean="0"/>
-              <a:t>28/02/2018</a:t>
+              <a:t>05/03/2018</a:t>
             </a:fld>
             <a:endParaRPr lang="en-GB"/>
           </a:p>
@@ -1818,7 +2625,7 @@
           <a:p>
             <a:fld id="{F9B79F2D-3A05-4848-97F8-7B346024FD0C}" type="datetimeFigureOut">
               <a:rPr lang="en-GB" smtClean="0"/>
-              <a:t>28/02/2018</a:t>
+              <a:t>05/03/2018</a:t>
             </a:fld>
             <a:endParaRPr lang="en-GB"/>
           </a:p>
@@ -2091,7 +2898,7 @@
           <a:p>
             <a:fld id="{F9B79F2D-3A05-4848-97F8-7B346024FD0C}" type="datetimeFigureOut">
               <a:rPr lang="en-GB" smtClean="0"/>
-              <a:t>28/02/2018</a:t>
+              <a:t>05/03/2018</a:t>
             </a:fld>
             <a:endParaRPr lang="en-GB"/>
           </a:p>
@@ -2432,7 +3239,7 @@
           <a:p>
             <a:fld id="{F9B79F2D-3A05-4848-97F8-7B346024FD0C}" type="datetimeFigureOut">
               <a:rPr lang="en-GB" smtClean="0"/>
-              <a:t>28/02/2018</a:t>
+              <a:t>05/03/2018</a:t>
             </a:fld>
             <a:endParaRPr lang="en-GB"/>
           </a:p>
@@ -3055,7 +3862,7 @@
           <a:p>
             <a:fld id="{F9B79F2D-3A05-4848-97F8-7B346024FD0C}" type="datetimeFigureOut">
               <a:rPr lang="en-GB" smtClean="0"/>
-              <a:t>28/02/2018</a:t>
+              <a:t>05/03/2018</a:t>
             </a:fld>
             <a:endParaRPr lang="en-GB"/>
           </a:p>
@@ -3915,7 +4722,7 @@
           <a:p>
             <a:fld id="{F9B79F2D-3A05-4848-97F8-7B346024FD0C}" type="datetimeFigureOut">
               <a:rPr lang="en-GB" smtClean="0"/>
-              <a:t>28/02/2018</a:t>
+              <a:t>05/03/2018</a:t>
             </a:fld>
             <a:endParaRPr lang="en-GB"/>
           </a:p>
@@ -4085,7 +4892,7 @@
           <a:p>
             <a:fld id="{F9B79F2D-3A05-4848-97F8-7B346024FD0C}" type="datetimeFigureOut">
               <a:rPr lang="en-GB" smtClean="0"/>
-              <a:t>28/02/2018</a:t>
+              <a:t>05/03/2018</a:t>
             </a:fld>
             <a:endParaRPr lang="en-GB"/>
           </a:p>
@@ -4265,7 +5072,7 @@
           <a:p>
             <a:fld id="{F9B79F2D-3A05-4848-97F8-7B346024FD0C}" type="datetimeFigureOut">
               <a:rPr lang="en-GB" smtClean="0"/>
-              <a:t>28/02/2018</a:t>
+              <a:t>05/03/2018</a:t>
             </a:fld>
             <a:endParaRPr lang="en-GB"/>
           </a:p>
@@ -4435,7 +5242,7 @@
           <a:p>
             <a:fld id="{F9B79F2D-3A05-4848-97F8-7B346024FD0C}" type="datetimeFigureOut">
               <a:rPr lang="en-GB" smtClean="0"/>
-              <a:t>28/02/2018</a:t>
+              <a:t>05/03/2018</a:t>
             </a:fld>
             <a:endParaRPr lang="en-GB"/>
           </a:p>
@@ -4682,7 +5489,7 @@
           <a:p>
             <a:fld id="{F9B79F2D-3A05-4848-97F8-7B346024FD0C}" type="datetimeFigureOut">
               <a:rPr lang="en-GB" smtClean="0"/>
-              <a:t>28/02/2018</a:t>
+              <a:t>05/03/2018</a:t>
             </a:fld>
             <a:endParaRPr lang="en-GB"/>
           </a:p>
@@ -4974,7 +5781,7 @@
           <a:p>
             <a:fld id="{F9B79F2D-3A05-4848-97F8-7B346024FD0C}" type="datetimeFigureOut">
               <a:rPr lang="en-GB" smtClean="0"/>
-              <a:t>28/02/2018</a:t>
+              <a:t>05/03/2018</a:t>
             </a:fld>
             <a:endParaRPr lang="en-GB"/>
           </a:p>
@@ -5418,7 +6225,7 @@
           <a:p>
             <a:fld id="{F9B79F2D-3A05-4848-97F8-7B346024FD0C}" type="datetimeFigureOut">
               <a:rPr lang="en-GB" smtClean="0"/>
-              <a:t>28/02/2018</a:t>
+              <a:t>05/03/2018</a:t>
             </a:fld>
             <a:endParaRPr lang="en-GB"/>
           </a:p>
@@ -5536,7 +6343,7 @@
           <a:p>
             <a:fld id="{F9B79F2D-3A05-4848-97F8-7B346024FD0C}" type="datetimeFigureOut">
               <a:rPr lang="en-GB" smtClean="0"/>
-              <a:t>28/02/2018</a:t>
+              <a:t>05/03/2018</a:t>
             </a:fld>
             <a:endParaRPr lang="en-GB"/>
           </a:p>
@@ -5631,7 +6438,7 @@
           <a:p>
             <a:fld id="{F9B79F2D-3A05-4848-97F8-7B346024FD0C}" type="datetimeFigureOut">
               <a:rPr lang="en-GB" smtClean="0"/>
-              <a:t>28/02/2018</a:t>
+              <a:t>05/03/2018</a:t>
             </a:fld>
             <a:endParaRPr lang="en-GB"/>
           </a:p>
@@ -5910,7 +6717,7 @@
           <a:p>
             <a:fld id="{F9B79F2D-3A05-4848-97F8-7B346024FD0C}" type="datetimeFigureOut">
               <a:rPr lang="en-GB" smtClean="0"/>
-              <a:t>28/02/2018</a:t>
+              <a:t>05/03/2018</a:t>
             </a:fld>
             <a:endParaRPr lang="en-GB"/>
           </a:p>
@@ -6185,7 +6992,7 @@
           <a:p>
             <a:fld id="{F9B79F2D-3A05-4848-97F8-7B346024FD0C}" type="datetimeFigureOut">
               <a:rPr lang="en-GB" smtClean="0"/>
-              <a:t>28/02/2018</a:t>
+              <a:t>05/03/2018</a:t>
             </a:fld>
             <a:endParaRPr lang="en-GB"/>
           </a:p>
@@ -6614,7 +7421,7 @@
           <a:p>
             <a:fld id="{F9B79F2D-3A05-4848-97F8-7B346024FD0C}" type="datetimeFigureOut">
               <a:rPr lang="en-GB" smtClean="0"/>
-              <a:t>28/02/2018</a:t>
+              <a:t>05/03/2018</a:t>
             </a:fld>
             <a:endParaRPr lang="en-GB"/>
           </a:p>
@@ -8304,42 +9111,44 @@
         </p:nvSpPr>
         <p:spPr/>
         <p:txBody>
-          <a:bodyPr/>
-          <a:lstStyle/>
-          <a:p>
-            <a:r>
-              <a:rPr lang="en-GB" dirty="0"/>
-              <a:t>The game is 2d</a:t>
-            </a:r>
-          </a:p>
-          <a:p>
-            <a:r>
-              <a:rPr lang="en-GB" dirty="0"/>
-              <a:t>The only control is tapping</a:t>
-            </a:r>
-          </a:p>
-          <a:p>
-            <a:r>
-              <a:rPr lang="en-GB" dirty="0"/>
+          <a:bodyPr>
+            <a:normAutofit/>
+          </a:bodyPr>
+          <a:lstStyle/>
+          <a:p>
+            <a:r>
+              <a:rPr lang="en-GB" sz="3000" dirty="0"/>
+              <a:t>2D</a:t>
+            </a:r>
+          </a:p>
+          <a:p>
+            <a:r>
+              <a:rPr lang="en-GB" sz="3000" dirty="0"/>
+              <a:t>Controlled by simple tap</a:t>
+            </a:r>
+          </a:p>
+          <a:p>
+            <a:r>
+              <a:rPr lang="en-GB" sz="3000" dirty="0"/>
               <a:t>Each player has a turn within one round</a:t>
             </a:r>
           </a:p>
           <a:p>
             <a:r>
-              <a:rPr lang="en-GB" dirty="0"/>
-              <a:t>The game will be played on one device</a:t>
-            </a:r>
-          </a:p>
-          <a:p>
-            <a:r>
-              <a:rPr lang="en-GB" dirty="0"/>
-              <a:t>The level design is symmetric</a:t>
-            </a:r>
-          </a:p>
-          <a:p>
-            <a:r>
-              <a:rPr lang="en-GB" dirty="0"/>
-              <a:t>There are two mechanics which make the game simple and intuitive</a:t>
+              <a:rPr lang="en-GB" sz="3000" dirty="0"/>
+              <a:t>Played on a mobile phone</a:t>
+            </a:r>
+          </a:p>
+          <a:p>
+            <a:r>
+              <a:rPr lang="en-GB" sz="3000" dirty="0"/>
+              <a:t>Symmetrical</a:t>
+            </a:r>
+          </a:p>
+          <a:p>
+            <a:r>
+              <a:rPr lang="en-GB" sz="3000" dirty="0"/>
+              <a:t>Simple and intuitive to play</a:t>
             </a:r>
           </a:p>
         </p:txBody>
@@ -8544,28 +9353,28 @@
           <a:lstStyle/>
           <a:p>
             <a:r>
-              <a:rPr lang="en-GB" dirty="0"/>
+              <a:rPr lang="en-GB" sz="3000" dirty="0"/>
               <a:t>Core audience</a:t>
             </a:r>
           </a:p>
           <a:p>
             <a:pPr lvl="1"/>
             <a:r>
-              <a:rPr lang="en-GB" dirty="0"/>
+              <a:rPr lang="en-GB" sz="3000" dirty="0"/>
               <a:t>Ages between 11-25</a:t>
             </a:r>
           </a:p>
           <a:p>
             <a:pPr lvl="1"/>
             <a:r>
-              <a:rPr lang="en-GB" dirty="0"/>
+              <a:rPr lang="en-GB" sz="3000" dirty="0"/>
               <a:t>Male</a:t>
             </a:r>
           </a:p>
           <a:p>
             <a:pPr lvl="1"/>
             <a:r>
-              <a:rPr lang="en-GB" dirty="0"/>
+              <a:rPr lang="en-GB" sz="3000" dirty="0"/>
               <a:t>casual gamers</a:t>
             </a:r>
           </a:p>
@@ -8800,35 +9609,37 @@
         </p:nvSpPr>
         <p:spPr/>
         <p:txBody>
-          <a:bodyPr/>
-          <a:lstStyle/>
-          <a:p>
-            <a:r>
-              <a:rPr lang="en-GB" dirty="0"/>
+          <a:bodyPr>
+            <a:normAutofit/>
+          </a:bodyPr>
+          <a:lstStyle/>
+          <a:p>
+            <a:r>
+              <a:rPr lang="en-GB" sz="3000" dirty="0"/>
               <a:t>We want both of the players to experience a sense of hard fun</a:t>
             </a:r>
           </a:p>
           <a:p>
             <a:pPr lvl="1"/>
             <a:r>
-              <a:rPr lang="en-GB" dirty="0" err="1"/>
+              <a:rPr lang="en-GB" sz="3000" dirty="0" err="1"/>
               <a:t>Fiero</a:t>
             </a:r>
             <a:r>
-              <a:rPr lang="en-GB" dirty="0"/>
+              <a:rPr lang="en-GB" sz="3000" dirty="0"/>
               <a:t>, strategy and obstacles</a:t>
             </a:r>
           </a:p>
           <a:p>
             <a:r>
-              <a:rPr lang="en-GB" dirty="0"/>
+              <a:rPr lang="en-GB" sz="3000" dirty="0"/>
               <a:t>A sense of people fun</a:t>
             </a:r>
           </a:p>
           <a:p>
             <a:pPr lvl="1"/>
             <a:r>
-              <a:rPr lang="en-GB" dirty="0"/>
+              <a:rPr lang="en-GB" sz="3000" dirty="0"/>
               <a:t>Amusement and player interaction</a:t>
             </a:r>
           </a:p>
@@ -9301,10 +10112,31 @@
         </p:nvSpPr>
         <p:spPr/>
         <p:txBody>
-          <a:bodyPr/>
-          <a:lstStyle/>
-          <a:p>
-            <a:endParaRPr lang="en-GB" dirty="0"/>
+          <a:bodyPr>
+            <a:normAutofit/>
+          </a:bodyPr>
+          <a:lstStyle/>
+          <a:p>
+            <a:r>
+              <a:rPr lang="en-GB" sz="3000" dirty="0"/>
+              <a:t>Improve the prototype based on player feedback</a:t>
+            </a:r>
+          </a:p>
+          <a:p>
+            <a:r>
+              <a:rPr lang="en-GB" sz="3000" dirty="0"/>
+              <a:t>Refine game mechanics</a:t>
+            </a:r>
+          </a:p>
+          <a:p>
+            <a:r>
+              <a:rPr lang="en-GB" sz="3000"/>
+              <a:t>Finalize </a:t>
+            </a:r>
+            <a:r>
+              <a:rPr lang="en-GB" sz="3000" dirty="0"/>
+              <a:t>the art</a:t>
+            </a:r>
           </a:p>
         </p:txBody>
       </p:sp>

</xml_diff>